<commit_message>
v3 - Dashboard en  pdf
</commit_message>
<xml_diff>
--- a/Présentation-AllanCouderette.pptx
+++ b/Présentation-AllanCouderette.pptx
@@ -8901,6 +8901,12 @@
           <a:p>
             <a:r>
               <a:rPr lang="fr-FR" dirty="0"/>
+              <a:t>3 min 10</a:t>
+            </a:r>
+          </a:p>
+          <a:p>
+            <a:r>
+              <a:rPr lang="fr-FR" dirty="0"/>
               <a:t>Aujourd’hui, le papier est encore présent</a:t>
             </a:r>
           </a:p>
@@ -8997,6 +9003,12 @@
           <a:p>
             <a:r>
               <a:rPr lang="fr-FR" dirty="0"/>
+              <a:t>4 min</a:t>
+            </a:r>
+          </a:p>
+          <a:p>
+            <a:r>
+              <a:rPr lang="fr-FR" dirty="0"/>
               <a:t>Allons chercher à rentre la télémétrie des pilotes interactive</a:t>
             </a:r>
           </a:p>
@@ -9081,6 +9093,12 @@
         <p:txBody>
           <a:bodyPr/>
           <a:lstStyle/>
+          <a:p>
+            <a:r>
+              <a:rPr lang="fr-FR" dirty="0"/>
+              <a:t>9 max</a:t>
+            </a:r>
+          </a:p>
           <a:p>
             <a:r>
               <a:rPr lang="fr-FR" dirty="0"/>
@@ -13192,7 +13210,7 @@
         </p:nvSpPr>
         <p:spPr>
           <a:xfrm rot="1505379">
-            <a:off x="7170416" y="-1302376"/>
+            <a:off x="6951959" y="-1542890"/>
             <a:ext cx="6857858" cy="3085779"/>
           </a:xfrm>
           <a:prstGeom prst="rect">

</xml_diff>